<commit_message>
change for each loop
</commit_message>
<xml_diff>
--- a/Project_2_Presentation.pptx
+++ b/Project_2_Presentation.pptx
@@ -11,6 +11,7 @@
     <p:sldId id="278" r:id="rId5"/>
     <p:sldId id="275" r:id="rId6"/>
     <p:sldId id="273" r:id="rId7"/>
+    <p:sldId id="279" r:id="rId8"/>
   </p:sldIdLst>
   <p:sldSz cx="12192000" cy="6858000"/>
   <p:notesSz cx="6858000" cy="9144000"/>
@@ -499,7 +500,7 @@
           <a:p>
             <a:fld id="{FE2819C9-2263-1A43-8F74-E42C80460847}" type="datetimeFigureOut">
               <a:rPr lang="en-US" smtClean="0"/>
-              <a:t>2/19/2021</a:t>
+              <a:t>2/22/21</a:t>
             </a:fld>
             <a:endParaRPr lang="en-US"/>
           </a:p>
@@ -697,7 +698,7 @@
           <a:p>
             <a:fld id="{FE2819C9-2263-1A43-8F74-E42C80460847}" type="datetimeFigureOut">
               <a:rPr lang="en-US" smtClean="0"/>
-              <a:t>2/19/2021</a:t>
+              <a:t>2/22/21</a:t>
             </a:fld>
             <a:endParaRPr lang="en-US"/>
           </a:p>
@@ -905,7 +906,7 @@
           <a:p>
             <a:fld id="{FE2819C9-2263-1A43-8F74-E42C80460847}" type="datetimeFigureOut">
               <a:rPr lang="en-US" smtClean="0"/>
-              <a:t>2/19/2021</a:t>
+              <a:t>2/22/21</a:t>
             </a:fld>
             <a:endParaRPr lang="en-US"/>
           </a:p>
@@ -1103,7 +1104,7 @@
           <a:p>
             <a:fld id="{FE2819C9-2263-1A43-8F74-E42C80460847}" type="datetimeFigureOut">
               <a:rPr lang="en-US" smtClean="0"/>
-              <a:t>2/19/2021</a:t>
+              <a:t>2/22/21</a:t>
             </a:fld>
             <a:endParaRPr lang="en-US"/>
           </a:p>
@@ -1378,7 +1379,7 @@
           <a:p>
             <a:fld id="{FE2819C9-2263-1A43-8F74-E42C80460847}" type="datetimeFigureOut">
               <a:rPr lang="en-US" smtClean="0"/>
-              <a:t>2/19/2021</a:t>
+              <a:t>2/22/21</a:t>
             </a:fld>
             <a:endParaRPr lang="en-US"/>
           </a:p>
@@ -1643,7 +1644,7 @@
           <a:p>
             <a:fld id="{FE2819C9-2263-1A43-8F74-E42C80460847}" type="datetimeFigureOut">
               <a:rPr lang="en-US" smtClean="0"/>
-              <a:t>2/19/2021</a:t>
+              <a:t>2/22/21</a:t>
             </a:fld>
             <a:endParaRPr lang="en-US"/>
           </a:p>
@@ -2055,7 +2056,7 @@
           <a:p>
             <a:fld id="{FE2819C9-2263-1A43-8F74-E42C80460847}" type="datetimeFigureOut">
               <a:rPr lang="en-US" smtClean="0"/>
-              <a:t>2/19/2021</a:t>
+              <a:t>2/22/21</a:t>
             </a:fld>
             <a:endParaRPr lang="en-US"/>
           </a:p>
@@ -2196,7 +2197,7 @@
           <a:p>
             <a:fld id="{FE2819C9-2263-1A43-8F74-E42C80460847}" type="datetimeFigureOut">
               <a:rPr lang="en-US" smtClean="0"/>
-              <a:t>2/19/2021</a:t>
+              <a:t>2/22/21</a:t>
             </a:fld>
             <a:endParaRPr lang="en-US"/>
           </a:p>
@@ -2309,7 +2310,7 @@
           <a:p>
             <a:fld id="{FE2819C9-2263-1A43-8F74-E42C80460847}" type="datetimeFigureOut">
               <a:rPr lang="en-US" smtClean="0"/>
-              <a:t>2/19/2021</a:t>
+              <a:t>2/22/21</a:t>
             </a:fld>
             <a:endParaRPr lang="en-US"/>
           </a:p>
@@ -2620,7 +2621,7 @@
           <a:p>
             <a:fld id="{FE2819C9-2263-1A43-8F74-E42C80460847}" type="datetimeFigureOut">
               <a:rPr lang="en-US" smtClean="0"/>
-              <a:t>2/19/2021</a:t>
+              <a:t>2/22/21</a:t>
             </a:fld>
             <a:endParaRPr lang="en-US"/>
           </a:p>
@@ -2908,7 +2909,7 @@
           <a:p>
             <a:fld id="{FE2819C9-2263-1A43-8F74-E42C80460847}" type="datetimeFigureOut">
               <a:rPr lang="en-US" smtClean="0"/>
-              <a:t>2/19/2021</a:t>
+              <a:t>2/22/21</a:t>
             </a:fld>
             <a:endParaRPr lang="en-US"/>
           </a:p>
@@ -3149,7 +3150,7 @@
           <a:p>
             <a:fld id="{FE2819C9-2263-1A43-8F74-E42C80460847}" type="datetimeFigureOut">
               <a:rPr lang="en-US" smtClean="0"/>
-              <a:t>2/19/2021</a:t>
+              <a:t>2/22/21</a:t>
             </a:fld>
             <a:endParaRPr lang="en-US"/>
           </a:p>
@@ -3794,7 +3795,7 @@
             <a:pPr algn="l"/>
             <a:r>
               <a:rPr lang="en-US" sz="11500" dirty="0"/>
-              <a:t>Movie Maps</a:t>
+              <a:t>Movie Visuals</a:t>
             </a:r>
           </a:p>
         </p:txBody>
@@ -6888,6 +6889,612 @@
     <p:extLst>
       <p:ext uri="{BB962C8B-B14F-4D97-AF65-F5344CB8AC3E}">
         <p14:creationId xmlns:p14="http://schemas.microsoft.com/office/powerpoint/2010/main" val="1350475094"/>
+      </p:ext>
+    </p:extLst>
+  </p:cSld>
+  <p:clrMapOvr>
+    <a:masterClrMapping/>
+  </p:clrMapOvr>
+</p:sld>
+</file>
+
+<file path=ppt/slides/slide7.xml><?xml version="1.0" encoding="utf-8"?>
+<p:sld xmlns:a="http://schemas.openxmlformats.org/drawingml/2006/main" xmlns:r="http://schemas.openxmlformats.org/officeDocument/2006/relationships" xmlns:p="http://schemas.openxmlformats.org/presentationml/2006/main">
+  <p:cSld>
+    <p:bg>
+      <p:bgPr>
+        <a:solidFill>
+          <a:schemeClr val="bg1"/>
+        </a:solidFill>
+        <a:effectLst/>
+      </p:bgPr>
+    </p:bg>
+    <p:spTree>
+      <p:nvGrpSpPr>
+        <p:cNvPr id="1" name=""/>
+        <p:cNvGrpSpPr/>
+        <p:nvPr/>
+      </p:nvGrpSpPr>
+      <p:grpSpPr>
+        <a:xfrm>
+          <a:off x="0" y="0"/>
+          <a:ext cx="0" cy="0"/>
+          <a:chOff x="0" y="0"/>
+          <a:chExt cx="0" cy="0"/>
+        </a:xfrm>
+      </p:grpSpPr>
+      <p:sp>
+        <p:nvSpPr>
+          <p:cNvPr id="2" name="Title 1">
+            <a:extLst>
+              <a:ext uri="{FF2B5EF4-FFF2-40B4-BE49-F238E27FC236}">
+                <a16:creationId xmlns:a16="http://schemas.microsoft.com/office/drawing/2014/main" id="{7176A5A4-38EE-D340-912D-5E5B338887E7}"/>
+              </a:ext>
+            </a:extLst>
+          </p:cNvPr>
+          <p:cNvSpPr>
+            <a:spLocks noGrp="1"/>
+          </p:cNvSpPr>
+          <p:nvPr>
+            <p:ph type="title"/>
+          </p:nvPr>
+        </p:nvSpPr>
+        <p:spPr>
+          <a:xfrm>
+            <a:off x="1653363" y="365760"/>
+            <a:ext cx="9367203" cy="1188720"/>
+          </a:xfrm>
+        </p:spPr>
+        <p:txBody>
+          <a:bodyPr>
+            <a:normAutofit/>
+          </a:bodyPr>
+          <a:lstStyle/>
+          <a:p>
+            <a:r>
+              <a:rPr lang="en-US" dirty="0"/>
+              <a:t>Movie Map</a:t>
+            </a:r>
+          </a:p>
+        </p:txBody>
+      </p:sp>
+      <p:sp>
+        <p:nvSpPr>
+          <p:cNvPr id="8" name="Freeform: Shape 7">
+            <a:extLst>
+              <a:ext uri="{FF2B5EF4-FFF2-40B4-BE49-F238E27FC236}">
+                <a16:creationId xmlns:a16="http://schemas.microsoft.com/office/drawing/2014/main" id="{7CB4857B-ED7C-444D-9F04-2F885114A1C2}"/>
+              </a:ext>
+              <a:ext uri="{C183D7F6-B498-43B3-948B-1728B52AA6E4}">
+                <adec:decorative xmlns:adec="http://schemas.microsoft.com/office/drawing/2017/decorative" val="1"/>
+              </a:ext>
+            </a:extLst>
+          </p:cNvPr>
+          <p:cNvSpPr>
+            <a:spLocks noGrp="1" noRot="1" noChangeAspect="1" noMove="1" noResize="1" noEditPoints="1" noAdjustHandles="1" noChangeArrowheads="1" noChangeShapeType="1" noTextEdit="1"/>
+          </p:cNvSpPr>
+          <p:nvPr>
+            <p:extLst>
+              <p:ext uri="{386F3935-93C4-4BCD-93E2-E3B085C9AB24}">
+                <p16:designElem xmlns:p16="http://schemas.microsoft.com/office/powerpoint/2015/main" val="1"/>
+              </p:ext>
+            </p:extLst>
+          </p:nvPr>
+        </p:nvSpPr>
+        <p:spPr>
+          <a:xfrm>
+            <a:off x="1" y="0"/>
+            <a:ext cx="1764099" cy="1558212"/>
+          </a:xfrm>
+          <a:custGeom>
+            <a:avLst/>
+            <a:gdLst>
+              <a:gd name="connsiteX0" fmla="*/ 0 w 1764099"/>
+              <a:gd name="connsiteY0" fmla="*/ 0 h 1558212"/>
+              <a:gd name="connsiteX1" fmla="*/ 1764099 w 1764099"/>
+              <a:gd name="connsiteY1" fmla="*/ 0 h 1558212"/>
+              <a:gd name="connsiteX2" fmla="*/ 1042087 w 1764099"/>
+              <a:gd name="connsiteY2" fmla="*/ 1558212 h 1558212"/>
+              <a:gd name="connsiteX3" fmla="*/ 0 w 1764099"/>
+              <a:gd name="connsiteY3" fmla="*/ 1558212 h 1558212"/>
+            </a:gdLst>
+            <a:ahLst/>
+            <a:cxnLst>
+              <a:cxn ang="0">
+                <a:pos x="connsiteX0" y="connsiteY0"/>
+              </a:cxn>
+              <a:cxn ang="0">
+                <a:pos x="connsiteX1" y="connsiteY1"/>
+              </a:cxn>
+              <a:cxn ang="0">
+                <a:pos x="connsiteX2" y="connsiteY2"/>
+              </a:cxn>
+              <a:cxn ang="0">
+                <a:pos x="connsiteX3" y="connsiteY3"/>
+              </a:cxn>
+            </a:cxnLst>
+            <a:rect l="l" t="t" r="r" b="b"/>
+            <a:pathLst>
+              <a:path w="1764099" h="1558212">
+                <a:moveTo>
+                  <a:pt x="0" y="0"/>
+                </a:moveTo>
+                <a:lnTo>
+                  <a:pt x="1764099" y="0"/>
+                </a:lnTo>
+                <a:lnTo>
+                  <a:pt x="1042087" y="1558212"/>
+                </a:lnTo>
+                <a:lnTo>
+                  <a:pt x="0" y="1558212"/>
+                </a:lnTo>
+                <a:close/>
+              </a:path>
+            </a:pathLst>
+          </a:custGeom>
+          <a:solidFill>
+            <a:schemeClr val="accent4"/>
+          </a:solidFill>
+          <a:ln>
+            <a:noFill/>
+          </a:ln>
+        </p:spPr>
+        <p:style>
+          <a:lnRef idx="2">
+            <a:schemeClr val="accent1">
+              <a:shade val="50000"/>
+            </a:schemeClr>
+          </a:lnRef>
+          <a:fillRef idx="1">
+            <a:schemeClr val="accent1"/>
+          </a:fillRef>
+          <a:effectRef idx="0">
+            <a:schemeClr val="accent1"/>
+          </a:effectRef>
+          <a:fontRef idx="minor">
+            <a:schemeClr val="lt1"/>
+          </a:fontRef>
+        </p:style>
+        <p:txBody>
+          <a:bodyPr wrap="square" rtlCol="0" anchor="ctr">
+            <a:noAutofit/>
+          </a:bodyPr>
+          <a:lstStyle/>
+          <a:p>
+            <a:pPr algn="ctr"/>
+            <a:endParaRPr lang="en-US"/>
+          </a:p>
+        </p:txBody>
+      </p:sp>
+      <p:sp>
+        <p:nvSpPr>
+          <p:cNvPr id="10" name="Freeform: Shape 9">
+            <a:extLst>
+              <a:ext uri="{FF2B5EF4-FFF2-40B4-BE49-F238E27FC236}">
+                <a16:creationId xmlns:a16="http://schemas.microsoft.com/office/drawing/2014/main" id="{D18046FB-44EA-4FD8-A585-EA09A319B2D0}"/>
+              </a:ext>
+              <a:ext uri="{C183D7F6-B498-43B3-948B-1728B52AA6E4}">
+                <adec:decorative xmlns:adec="http://schemas.microsoft.com/office/drawing/2017/decorative" val="1"/>
+              </a:ext>
+            </a:extLst>
+          </p:cNvPr>
+          <p:cNvSpPr>
+            <a:spLocks noGrp="1" noRot="1" noChangeAspect="1" noMove="1" noResize="1" noEditPoints="1" noAdjustHandles="1" noChangeArrowheads="1" noChangeShapeType="1" noTextEdit="1"/>
+          </p:cNvSpPr>
+          <p:nvPr>
+            <p:extLst>
+              <p:ext uri="{386F3935-93C4-4BCD-93E2-E3B085C9AB24}">
+                <p16:designElem xmlns:p16="http://schemas.microsoft.com/office/powerpoint/2015/main" val="1"/>
+              </p:ext>
+            </p:extLst>
+          </p:nvPr>
+        </p:nvSpPr>
+        <p:spPr>
+          <a:xfrm>
+            <a:off x="1" y="1691640"/>
+            <a:ext cx="12191999" cy="5166360"/>
+          </a:xfrm>
+          <a:custGeom>
+            <a:avLst/>
+            <a:gdLst>
+              <a:gd name="connsiteX0" fmla="*/ 0 w 12191999"/>
+              <a:gd name="connsiteY0" fmla="*/ 0 h 5166360"/>
+              <a:gd name="connsiteX1" fmla="*/ 1822388 w 12191999"/>
+              <a:gd name="connsiteY1" fmla="*/ 0 h 5166360"/>
+              <a:gd name="connsiteX2" fmla="*/ 6468290 w 12191999"/>
+              <a:gd name="connsiteY2" fmla="*/ 0 h 5166360"/>
+              <a:gd name="connsiteX3" fmla="*/ 7796394 w 12191999"/>
+              <a:gd name="connsiteY3" fmla="*/ 0 h 5166360"/>
+              <a:gd name="connsiteX4" fmla="*/ 8376834 w 12191999"/>
+              <a:gd name="connsiteY4" fmla="*/ 0 h 5166360"/>
+              <a:gd name="connsiteX5" fmla="*/ 9704938 w 12191999"/>
+              <a:gd name="connsiteY5" fmla="*/ 0 h 5166360"/>
+              <a:gd name="connsiteX6" fmla="*/ 9704938 w 12191999"/>
+              <a:gd name="connsiteY6" fmla="*/ 2 h 5166360"/>
+              <a:gd name="connsiteX7" fmla="*/ 10283456 w 12191999"/>
+              <a:gd name="connsiteY7" fmla="*/ 2 h 5166360"/>
+              <a:gd name="connsiteX8" fmla="*/ 10863897 w 12191999"/>
+              <a:gd name="connsiteY8" fmla="*/ 2 h 5166360"/>
+              <a:gd name="connsiteX9" fmla="*/ 12191999 w 12191999"/>
+              <a:gd name="connsiteY9" fmla="*/ 2 h 5166360"/>
+              <a:gd name="connsiteX10" fmla="*/ 12191999 w 12191999"/>
+              <a:gd name="connsiteY10" fmla="*/ 5166360 h 5166360"/>
+              <a:gd name="connsiteX11" fmla="*/ 0 w 12191999"/>
+              <a:gd name="connsiteY11" fmla="*/ 5166360 h 5166360"/>
+              <a:gd name="connsiteX12" fmla="*/ 0 w 12191999"/>
+              <a:gd name="connsiteY12" fmla="*/ 2604436 h 5166360"/>
+              <a:gd name="connsiteX13" fmla="*/ 862341 w 12191999"/>
+              <a:gd name="connsiteY13" fmla="*/ 743371 h 5166360"/>
+              <a:gd name="connsiteX14" fmla="*/ 0 w 12191999"/>
+              <a:gd name="connsiteY14" fmla="*/ 743371 h 5166360"/>
+              <a:gd name="connsiteX15" fmla="*/ 0 w 12191999"/>
+              <a:gd name="connsiteY15" fmla="*/ 742508 h 5166360"/>
+              <a:gd name="connsiteX16" fmla="*/ 92826 w 12191999"/>
+              <a:gd name="connsiteY16" fmla="*/ 742508 h 5166360"/>
+              <a:gd name="connsiteX17" fmla="*/ 406486 w 12191999"/>
+              <a:gd name="connsiteY17" fmla="*/ 742508 h 5166360"/>
+              <a:gd name="connsiteX18" fmla="*/ 406486 w 12191999"/>
+              <a:gd name="connsiteY18" fmla="*/ 742507 h 5166360"/>
+              <a:gd name="connsiteX19" fmla="*/ 862741 w 12191999"/>
+              <a:gd name="connsiteY19" fmla="*/ 742507 h 5166360"/>
+              <a:gd name="connsiteX20" fmla="*/ 1206388 w 12191999"/>
+              <a:gd name="connsiteY20" fmla="*/ 864 h 5166360"/>
+              <a:gd name="connsiteX21" fmla="*/ 748500 w 12191999"/>
+              <a:gd name="connsiteY21" fmla="*/ 864 h 5166360"/>
+              <a:gd name="connsiteX22" fmla="*/ 0 w 12191999"/>
+              <a:gd name="connsiteY22" fmla="*/ 864 h 5166360"/>
+            </a:gdLst>
+            <a:ahLst/>
+            <a:cxnLst>
+              <a:cxn ang="0">
+                <a:pos x="connsiteX0" y="connsiteY0"/>
+              </a:cxn>
+              <a:cxn ang="0">
+                <a:pos x="connsiteX1" y="connsiteY1"/>
+              </a:cxn>
+              <a:cxn ang="0">
+                <a:pos x="connsiteX2" y="connsiteY2"/>
+              </a:cxn>
+              <a:cxn ang="0">
+                <a:pos x="connsiteX3" y="connsiteY3"/>
+              </a:cxn>
+              <a:cxn ang="0">
+                <a:pos x="connsiteX4" y="connsiteY4"/>
+              </a:cxn>
+              <a:cxn ang="0">
+                <a:pos x="connsiteX5" y="connsiteY5"/>
+              </a:cxn>
+              <a:cxn ang="0">
+                <a:pos x="connsiteX6" y="connsiteY6"/>
+              </a:cxn>
+              <a:cxn ang="0">
+                <a:pos x="connsiteX7" y="connsiteY7"/>
+              </a:cxn>
+              <a:cxn ang="0">
+                <a:pos x="connsiteX8" y="connsiteY8"/>
+              </a:cxn>
+              <a:cxn ang="0">
+                <a:pos x="connsiteX9" y="connsiteY9"/>
+              </a:cxn>
+              <a:cxn ang="0">
+                <a:pos x="connsiteX10" y="connsiteY10"/>
+              </a:cxn>
+              <a:cxn ang="0">
+                <a:pos x="connsiteX11" y="connsiteY11"/>
+              </a:cxn>
+              <a:cxn ang="0">
+                <a:pos x="connsiteX12" y="connsiteY12"/>
+              </a:cxn>
+              <a:cxn ang="0">
+                <a:pos x="connsiteX13" y="connsiteY13"/>
+              </a:cxn>
+              <a:cxn ang="0">
+                <a:pos x="connsiteX14" y="connsiteY14"/>
+              </a:cxn>
+              <a:cxn ang="0">
+                <a:pos x="connsiteX15" y="connsiteY15"/>
+              </a:cxn>
+              <a:cxn ang="0">
+                <a:pos x="connsiteX16" y="connsiteY16"/>
+              </a:cxn>
+              <a:cxn ang="0">
+                <a:pos x="connsiteX17" y="connsiteY17"/>
+              </a:cxn>
+              <a:cxn ang="0">
+                <a:pos x="connsiteX18" y="connsiteY18"/>
+              </a:cxn>
+              <a:cxn ang="0">
+                <a:pos x="connsiteX19" y="connsiteY19"/>
+              </a:cxn>
+              <a:cxn ang="0">
+                <a:pos x="connsiteX20" y="connsiteY20"/>
+              </a:cxn>
+              <a:cxn ang="0">
+                <a:pos x="connsiteX21" y="connsiteY21"/>
+              </a:cxn>
+              <a:cxn ang="0">
+                <a:pos x="connsiteX22" y="connsiteY22"/>
+              </a:cxn>
+            </a:cxnLst>
+            <a:rect l="l" t="t" r="r" b="b"/>
+            <a:pathLst>
+              <a:path w="12191999" h="5166360">
+                <a:moveTo>
+                  <a:pt x="0" y="0"/>
+                </a:moveTo>
+                <a:lnTo>
+                  <a:pt x="1822388" y="0"/>
+                </a:lnTo>
+                <a:lnTo>
+                  <a:pt x="6468290" y="0"/>
+                </a:lnTo>
+                <a:lnTo>
+                  <a:pt x="7796394" y="0"/>
+                </a:lnTo>
+                <a:lnTo>
+                  <a:pt x="8376834" y="0"/>
+                </a:lnTo>
+                <a:lnTo>
+                  <a:pt x="9704938" y="0"/>
+                </a:lnTo>
+                <a:lnTo>
+                  <a:pt x="9704938" y="2"/>
+                </a:lnTo>
+                <a:lnTo>
+                  <a:pt x="10283456" y="2"/>
+                </a:lnTo>
+                <a:lnTo>
+                  <a:pt x="10863897" y="2"/>
+                </a:lnTo>
+                <a:lnTo>
+                  <a:pt x="12191999" y="2"/>
+                </a:lnTo>
+                <a:lnTo>
+                  <a:pt x="12191999" y="5166360"/>
+                </a:lnTo>
+                <a:lnTo>
+                  <a:pt x="0" y="5166360"/>
+                </a:lnTo>
+                <a:lnTo>
+                  <a:pt x="0" y="2604436"/>
+                </a:lnTo>
+                <a:lnTo>
+                  <a:pt x="862341" y="743371"/>
+                </a:lnTo>
+                <a:lnTo>
+                  <a:pt x="0" y="743371"/>
+                </a:lnTo>
+                <a:lnTo>
+                  <a:pt x="0" y="742508"/>
+                </a:lnTo>
+                <a:lnTo>
+                  <a:pt x="92826" y="742508"/>
+                </a:lnTo>
+                <a:lnTo>
+                  <a:pt x="406486" y="742508"/>
+                </a:lnTo>
+                <a:lnTo>
+                  <a:pt x="406486" y="742507"/>
+                </a:lnTo>
+                <a:lnTo>
+                  <a:pt x="862741" y="742507"/>
+                </a:lnTo>
+                <a:lnTo>
+                  <a:pt x="1206388" y="864"/>
+                </a:lnTo>
+                <a:lnTo>
+                  <a:pt x="748500" y="864"/>
+                </a:lnTo>
+                <a:lnTo>
+                  <a:pt x="0" y="864"/>
+                </a:lnTo>
+                <a:close/>
+              </a:path>
+            </a:pathLst>
+          </a:custGeom>
+          <a:solidFill>
+            <a:srgbClr val="A6A6A6">
+              <a:alpha val="49804"/>
+            </a:srgbClr>
+          </a:solidFill>
+          <a:ln>
+            <a:noFill/>
+          </a:ln>
+        </p:spPr>
+        <p:style>
+          <a:lnRef idx="2">
+            <a:schemeClr val="accent1">
+              <a:shade val="50000"/>
+            </a:schemeClr>
+          </a:lnRef>
+          <a:fillRef idx="1">
+            <a:schemeClr val="accent1"/>
+          </a:fillRef>
+          <a:effectRef idx="0">
+            <a:schemeClr val="accent1"/>
+          </a:effectRef>
+          <a:fontRef idx="minor">
+            <a:schemeClr val="lt1"/>
+          </a:fontRef>
+        </p:style>
+        <p:txBody>
+          <a:bodyPr wrap="square" rtlCol="0" anchor="ctr">
+            <a:noAutofit/>
+          </a:bodyPr>
+          <a:lstStyle/>
+          <a:p>
+            <a:pPr algn="ctr"/>
+            <a:endParaRPr lang="en-US"/>
+          </a:p>
+        </p:txBody>
+      </p:sp>
+      <p:sp>
+        <p:nvSpPr>
+          <p:cNvPr id="12" name="Freeform: Shape 11">
+            <a:extLst>
+              <a:ext uri="{FF2B5EF4-FFF2-40B4-BE49-F238E27FC236}">
+                <a16:creationId xmlns:a16="http://schemas.microsoft.com/office/drawing/2014/main" id="{479F5F2B-8B58-4140-AE6A-51F6C67B18D9}"/>
+              </a:ext>
+              <a:ext uri="{C183D7F6-B498-43B3-948B-1728B52AA6E4}">
+                <adec:decorative xmlns:adec="http://schemas.microsoft.com/office/drawing/2017/decorative" val="1"/>
+              </a:ext>
+            </a:extLst>
+          </p:cNvPr>
+          <p:cNvSpPr>
+            <a:spLocks noGrp="1" noRot="1" noChangeAspect="1" noMove="1" noResize="1" noEditPoints="1" noAdjustHandles="1" noChangeArrowheads="1" noChangeShapeType="1" noTextEdit="1"/>
+          </p:cNvSpPr>
+          <p:nvPr>
+            <p:extLst>
+              <p:ext uri="{386F3935-93C4-4BCD-93E2-E3B085C9AB24}">
+                <p16:designElem xmlns:p16="http://schemas.microsoft.com/office/powerpoint/2015/main" val="1"/>
+              </p:ext>
+            </p:extLst>
+          </p:nvPr>
+        </p:nvSpPr>
+        <p:spPr>
+          <a:xfrm>
+            <a:off x="0" y="1691641"/>
+            <a:ext cx="971654" cy="2096979"/>
+          </a:xfrm>
+          <a:custGeom>
+            <a:avLst/>
+            <a:gdLst>
+              <a:gd name="connsiteX0" fmla="*/ 0 w 971654"/>
+              <a:gd name="connsiteY0" fmla="*/ 0 h 2096979"/>
+              <a:gd name="connsiteX1" fmla="*/ 971654 w 971654"/>
+              <a:gd name="connsiteY1" fmla="*/ 0 h 2096979"/>
+              <a:gd name="connsiteX2" fmla="*/ 0 w 971654"/>
+              <a:gd name="connsiteY2" fmla="*/ 2096979 h 2096979"/>
+            </a:gdLst>
+            <a:ahLst/>
+            <a:cxnLst>
+              <a:cxn ang="0">
+                <a:pos x="connsiteX0" y="connsiteY0"/>
+              </a:cxn>
+              <a:cxn ang="0">
+                <a:pos x="connsiteX1" y="connsiteY1"/>
+              </a:cxn>
+              <a:cxn ang="0">
+                <a:pos x="connsiteX2" y="connsiteY2"/>
+              </a:cxn>
+            </a:cxnLst>
+            <a:rect l="l" t="t" r="r" b="b"/>
+            <a:pathLst>
+              <a:path w="971654" h="2096979">
+                <a:moveTo>
+                  <a:pt x="0" y="0"/>
+                </a:moveTo>
+                <a:lnTo>
+                  <a:pt x="971654" y="0"/>
+                </a:lnTo>
+                <a:lnTo>
+                  <a:pt x="0" y="2096979"/>
+                </a:lnTo>
+                <a:close/>
+              </a:path>
+            </a:pathLst>
+          </a:custGeom>
+          <a:solidFill>
+            <a:srgbClr val="404040"/>
+          </a:solidFill>
+          <a:ln>
+            <a:noFill/>
+          </a:ln>
+        </p:spPr>
+        <p:style>
+          <a:lnRef idx="2">
+            <a:schemeClr val="accent1">
+              <a:shade val="50000"/>
+            </a:schemeClr>
+          </a:lnRef>
+          <a:fillRef idx="1">
+            <a:schemeClr val="accent1"/>
+          </a:fillRef>
+          <a:effectRef idx="0">
+            <a:schemeClr val="accent1"/>
+          </a:effectRef>
+          <a:fontRef idx="minor">
+            <a:schemeClr val="lt1"/>
+          </a:fontRef>
+        </p:style>
+        <p:txBody>
+          <a:bodyPr wrap="square" rtlCol="0" anchor="ctr">
+            <a:noAutofit/>
+          </a:bodyPr>
+          <a:lstStyle/>
+          <a:p>
+            <a:pPr algn="ctr"/>
+            <a:endParaRPr lang="en-US"/>
+          </a:p>
+        </p:txBody>
+      </p:sp>
+      <p:sp>
+        <p:nvSpPr>
+          <p:cNvPr id="3" name="Content Placeholder 2">
+            <a:extLst>
+              <a:ext uri="{FF2B5EF4-FFF2-40B4-BE49-F238E27FC236}">
+                <a16:creationId xmlns:a16="http://schemas.microsoft.com/office/drawing/2014/main" id="{EA8B7AEE-53CE-004B-ABF8-67CE77FE573C}"/>
+              </a:ext>
+            </a:extLst>
+          </p:cNvPr>
+          <p:cNvSpPr>
+            <a:spLocks noGrp="1"/>
+          </p:cNvSpPr>
+          <p:nvPr>
+            <p:ph idx="1"/>
+          </p:nvPr>
+        </p:nvSpPr>
+        <p:spPr>
+          <a:xfrm>
+            <a:off x="1653363" y="2176272"/>
+            <a:ext cx="9367204" cy="4041648"/>
+          </a:xfrm>
+        </p:spPr>
+        <p:txBody>
+          <a:bodyPr anchor="t">
+            <a:normAutofit/>
+          </a:bodyPr>
+          <a:lstStyle/>
+          <a:p>
+            <a:pPr marL="0" indent="0">
+              <a:buNone/>
+            </a:pPr>
+            <a:r>
+              <a:rPr lang="en-US" sz="2400" dirty="0"/>
+              <a:t>The idea was to use what we learned about leaflet and </a:t>
+            </a:r>
+            <a:r>
+              <a:rPr lang="en-US" sz="2400" dirty="0" err="1"/>
+              <a:t>mapbox</a:t>
+            </a:r>
+            <a:r>
+              <a:rPr lang="en-US" sz="2400" dirty="0"/>
+              <a:t> to generate a map with movie data. We thought it would be interesting to see the highest revenue movies for each production country. </a:t>
+            </a:r>
+          </a:p>
+          <a:p>
+            <a:r>
+              <a:rPr lang="en-US" sz="2400" dirty="0"/>
+              <a:t>Found the for each loop to be the best tool for extracting this data from the </a:t>
+            </a:r>
+            <a:r>
+              <a:rPr lang="en-US" sz="2400"/>
+              <a:t>json object.</a:t>
+            </a:r>
+            <a:endParaRPr lang="en-US" sz="2400" dirty="0"/>
+          </a:p>
+          <a:p>
+            <a:r>
+              <a:rPr lang="en-US" sz="2400" dirty="0"/>
+              <a:t>Note: many movies in the dataset had no production country so they had to be excluded.</a:t>
+            </a:r>
+          </a:p>
+        </p:txBody>
+      </p:sp>
+    </p:spTree>
+    <p:extLst>
+      <p:ext uri="{BB962C8B-B14F-4D97-AF65-F5344CB8AC3E}">
+        <p14:creationId xmlns:p14="http://schemas.microsoft.com/office/powerpoint/2010/main" val="3480467992"/>
       </p:ext>
     </p:extLst>
   </p:cSld>

</xml_diff>

<commit_message>
add movie map slide to powerpoint
</commit_message>
<xml_diff>
--- a/Project_2_Presentation.pptx
+++ b/Project_2_Presentation.pptx
@@ -3838,7 +3838,7 @@
             <a:pPr algn="l"/>
             <a:r>
               <a:rPr lang="en-US" sz="1900" dirty="0"/>
-              <a:t>February 21, 2021</a:t>
+              <a:t>February 23, 2021</a:t>
             </a:r>
           </a:p>
           <a:p>
@@ -7452,7 +7452,7 @@
         </p:spPr>
         <p:txBody>
           <a:bodyPr anchor="t">
-            <a:normAutofit/>
+            <a:normAutofit fontScale="85000" lnSpcReduction="10000"/>
           </a:bodyPr>
           <a:lstStyle/>
           <a:p>
@@ -7465,7 +7465,7 @@
             </a:r>
             <a:r>
               <a:rPr lang="en-US" sz="2400" dirty="0" err="1"/>
-              <a:t>mapbox</a:t>
+              <a:t>Mapbox</a:t>
             </a:r>
             <a:r>
               <a:rPr lang="en-US" sz="2400" dirty="0"/>
@@ -7475,19 +7475,42 @@
           <a:p>
             <a:r>
               <a:rPr lang="en-US" sz="2400" dirty="0"/>
-              <a:t>Found the for each loop to be the best tool for extracting this data from the </a:t>
-            </a:r>
-            <a:r>
-              <a:rPr lang="en-US" sz="2400"/>
-              <a:t>json object.</a:t>
-            </a:r>
-            <a:endParaRPr lang="en-US" sz="2400" dirty="0"/>
+              <a:t>Found the for each loop to be the best tool for extracting this data from the json object. </a:t>
+            </a:r>
           </a:p>
           <a:p>
             <a:r>
               <a:rPr lang="en-US" sz="2400" dirty="0"/>
               <a:t>Note: many movies in the dataset had no production country so they had to be excluded.</a:t>
             </a:r>
+          </a:p>
+          <a:p>
+            <a:r>
+              <a:rPr lang="en-US" sz="2400" dirty="0"/>
+              <a:t>Discovered that even so-called free sources of online data have limits. For example, had quota limits on looking up latitude and longitude for the production countries, and the API key did not always work on </a:t>
+            </a:r>
+            <a:r>
+              <a:rPr lang="en-US" sz="2400" dirty="0" err="1"/>
+              <a:t>Mapbox</a:t>
+            </a:r>
+            <a:r>
+              <a:rPr lang="en-US" sz="2400" dirty="0"/>
+              <a:t> so it had to be reset. </a:t>
+            </a:r>
+          </a:p>
+          <a:p>
+            <a:r>
+              <a:rPr lang="en-US" sz="2400" dirty="0"/>
+              <a:t>Other challenges included not being able to render a map on the page due to CSS style issues. Had to hard code CSS into the webpage html so that the map would show up, and even when it did there were borders on the tiles. So, it’s not the </a:t>
+            </a:r>
+            <a:r>
+              <a:rPr lang="en-US" sz="2400"/>
+              <a:t>best-looking map.</a:t>
+            </a:r>
+            <a:endParaRPr lang="en-US" sz="2400" dirty="0"/>
+          </a:p>
+          <a:p>
+            <a:endParaRPr lang="en-US" sz="2400" dirty="0"/>
           </a:p>
         </p:txBody>
       </p:sp>

</xml_diff>

<commit_message>
minor update to the ppt
</commit_message>
<xml_diff>
--- a/Project_2_Presentation.pptx
+++ b/Project_2_Presentation.pptx
@@ -10,8 +10,8 @@
     <p:sldId id="274" r:id="rId4"/>
     <p:sldId id="278" r:id="rId5"/>
     <p:sldId id="275" r:id="rId6"/>
-    <p:sldId id="273" r:id="rId7"/>
-    <p:sldId id="279" r:id="rId8"/>
+    <p:sldId id="279" r:id="rId7"/>
+    <p:sldId id="273" r:id="rId8"/>
   </p:sldIdLst>
   <p:sldSz cx="12192000" cy="6858000"/>
   <p:notesSz cx="6858000" cy="9144000"/>
@@ -131,7 +131,7 @@
   <pc:docChgLst>
     <pc:chgData name="Galloway, Sean" userId="bd4be2bb-e703-4c47-a458-a89298e08615" providerId="ADAL" clId="{6044021B-9139-4B90-8970-84D2810F7734}"/>
     <pc:docChg chg="custSel addSld delSld modSld sldOrd">
-      <pc:chgData name="Galloway, Sean" userId="bd4be2bb-e703-4c47-a458-a89298e08615" providerId="ADAL" clId="{6044021B-9139-4B90-8970-84D2810F7734}" dt="2021-02-19T19:42:46.821" v="2789" actId="20577"/>
+      <pc:chgData name="Galloway, Sean" userId="bd4be2bb-e703-4c47-a458-a89298e08615" providerId="ADAL" clId="{6044021B-9139-4B90-8970-84D2810F7734}" dt="2021-02-23T12:56:57.528" v="2791"/>
       <pc:docMkLst>
         <pc:docMk/>
       </pc:docMkLst>
@@ -348,6 +348,13 @@
           </ac:spMkLst>
         </pc:spChg>
       </pc:sldChg>
+      <pc:sldChg chg="ord">
+        <pc:chgData name="Galloway, Sean" userId="bd4be2bb-e703-4c47-a458-a89298e08615" providerId="ADAL" clId="{6044021B-9139-4B90-8970-84D2810F7734}" dt="2021-02-23T12:56:57.528" v="2791"/>
+        <pc:sldMkLst>
+          <pc:docMk/>
+          <pc:sldMk cId="3480467992" sldId="279"/>
+        </pc:sldMkLst>
+      </pc:sldChg>
     </pc:docChg>
   </pc:docChgLst>
 </pc:chgInfo>
@@ -500,7 +507,7 @@
           <a:p>
             <a:fld id="{FE2819C9-2263-1A43-8F74-E42C80460847}" type="datetimeFigureOut">
               <a:rPr lang="en-US" smtClean="0"/>
-              <a:t>2/22/21</a:t>
+              <a:t>2/23/2021</a:t>
             </a:fld>
             <a:endParaRPr lang="en-US"/>
           </a:p>
@@ -698,7 +705,7 @@
           <a:p>
             <a:fld id="{FE2819C9-2263-1A43-8F74-E42C80460847}" type="datetimeFigureOut">
               <a:rPr lang="en-US" smtClean="0"/>
-              <a:t>2/22/21</a:t>
+              <a:t>2/23/2021</a:t>
             </a:fld>
             <a:endParaRPr lang="en-US"/>
           </a:p>
@@ -906,7 +913,7 @@
           <a:p>
             <a:fld id="{FE2819C9-2263-1A43-8F74-E42C80460847}" type="datetimeFigureOut">
               <a:rPr lang="en-US" smtClean="0"/>
-              <a:t>2/22/21</a:t>
+              <a:t>2/23/2021</a:t>
             </a:fld>
             <a:endParaRPr lang="en-US"/>
           </a:p>
@@ -1104,7 +1111,7 @@
           <a:p>
             <a:fld id="{FE2819C9-2263-1A43-8F74-E42C80460847}" type="datetimeFigureOut">
               <a:rPr lang="en-US" smtClean="0"/>
-              <a:t>2/22/21</a:t>
+              <a:t>2/23/2021</a:t>
             </a:fld>
             <a:endParaRPr lang="en-US"/>
           </a:p>
@@ -1379,7 +1386,7 @@
           <a:p>
             <a:fld id="{FE2819C9-2263-1A43-8F74-E42C80460847}" type="datetimeFigureOut">
               <a:rPr lang="en-US" smtClean="0"/>
-              <a:t>2/22/21</a:t>
+              <a:t>2/23/2021</a:t>
             </a:fld>
             <a:endParaRPr lang="en-US"/>
           </a:p>
@@ -1644,7 +1651,7 @@
           <a:p>
             <a:fld id="{FE2819C9-2263-1A43-8F74-E42C80460847}" type="datetimeFigureOut">
               <a:rPr lang="en-US" smtClean="0"/>
-              <a:t>2/22/21</a:t>
+              <a:t>2/23/2021</a:t>
             </a:fld>
             <a:endParaRPr lang="en-US"/>
           </a:p>
@@ -2056,7 +2063,7 @@
           <a:p>
             <a:fld id="{FE2819C9-2263-1A43-8F74-E42C80460847}" type="datetimeFigureOut">
               <a:rPr lang="en-US" smtClean="0"/>
-              <a:t>2/22/21</a:t>
+              <a:t>2/23/2021</a:t>
             </a:fld>
             <a:endParaRPr lang="en-US"/>
           </a:p>
@@ -2197,7 +2204,7 @@
           <a:p>
             <a:fld id="{FE2819C9-2263-1A43-8F74-E42C80460847}" type="datetimeFigureOut">
               <a:rPr lang="en-US" smtClean="0"/>
-              <a:t>2/22/21</a:t>
+              <a:t>2/23/2021</a:t>
             </a:fld>
             <a:endParaRPr lang="en-US"/>
           </a:p>
@@ -2310,7 +2317,7 @@
           <a:p>
             <a:fld id="{FE2819C9-2263-1A43-8F74-E42C80460847}" type="datetimeFigureOut">
               <a:rPr lang="en-US" smtClean="0"/>
-              <a:t>2/22/21</a:t>
+              <a:t>2/23/2021</a:t>
             </a:fld>
             <a:endParaRPr lang="en-US"/>
           </a:p>
@@ -2621,7 +2628,7 @@
           <a:p>
             <a:fld id="{FE2819C9-2263-1A43-8F74-E42C80460847}" type="datetimeFigureOut">
               <a:rPr lang="en-US" smtClean="0"/>
-              <a:t>2/22/21</a:t>
+              <a:t>2/23/2021</a:t>
             </a:fld>
             <a:endParaRPr lang="en-US"/>
           </a:p>
@@ -2909,7 +2916,7 @@
           <a:p>
             <a:fld id="{FE2819C9-2263-1A43-8F74-E42C80460847}" type="datetimeFigureOut">
               <a:rPr lang="en-US" smtClean="0"/>
-              <a:t>2/22/21</a:t>
+              <a:t>2/23/2021</a:t>
             </a:fld>
             <a:endParaRPr lang="en-US"/>
           </a:p>
@@ -3150,7 +3157,7 @@
           <a:p>
             <a:fld id="{FE2819C9-2263-1A43-8F74-E42C80460847}" type="datetimeFigureOut">
               <a:rPr lang="en-US" smtClean="0"/>
-              <a:t>2/22/21</a:t>
+              <a:t>2/23/2021</a:t>
             </a:fld>
             <a:endParaRPr lang="en-US"/>
           </a:p>
@@ -6360,7 +6367,7 @@
           <a:p>
             <a:r>
               <a:rPr lang="en-US" dirty="0"/>
-              <a:t>Word Cloud</a:t>
+              <a:t>Movie Map</a:t>
             </a:r>
           </a:p>
         </p:txBody>
@@ -6859,7 +6866,7 @@
         </p:spPr>
         <p:txBody>
           <a:bodyPr anchor="t">
-            <a:normAutofit/>
+            <a:normAutofit fontScale="85000" lnSpcReduction="10000"/>
           </a:bodyPr>
           <a:lstStyle/>
           <a:p>
@@ -6868,27 +6875,63 @@
             </a:pPr>
             <a:r>
               <a:rPr lang="en-US" sz="2400" dirty="0"/>
-              <a:t>The idea was that it would be interesting to see the word cloud generated from the keywords associated with each movie when filtering for the movie genre. </a:t>
-            </a:r>
-          </a:p>
-          <a:p>
+              <a:t>The idea was to use what we learned about leaflet and </a:t>
+            </a:r>
+            <a:r>
+              <a:rPr lang="en-US" sz="2400" dirty="0" err="1"/>
+              <a:t>Mapbox</a:t>
+            </a:r>
             <a:r>
               <a:rPr lang="en-US" sz="2400" dirty="0"/>
-              <a:t>Note: some movies are associated with more than one genre. </a:t>
+              <a:t> to generate a map with movie data. We thought it would be interesting to see the highest revenue movies for each production country. </a:t>
             </a:r>
           </a:p>
           <a:p>
             <a:r>
               <a:rPr lang="en-US" sz="2400" dirty="0"/>
-              <a:t>The cloud.js library is an open source word cloud generation library that we got from bl.ocks.org. This library used an older version of D3 so we enabled each visualization to be able to uniquely select the D3 version since other visualizations needed the latest version.</a:t>
-            </a:r>
+              <a:t>Found the for each loop to be the best tool for extracting this data from the json object. </a:t>
+            </a:r>
+          </a:p>
+          <a:p>
+            <a:r>
+              <a:rPr lang="en-US" sz="2400" dirty="0"/>
+              <a:t>Note: many movies in the dataset had no production country so they had to be excluded.</a:t>
+            </a:r>
+          </a:p>
+          <a:p>
+            <a:r>
+              <a:rPr lang="en-US" sz="2400" dirty="0"/>
+              <a:t>Discovered that even so-called free sources of online data have limits. For example, had quota limits on looking up latitude and longitude for the production countries, and the API key did not always work on </a:t>
+            </a:r>
+            <a:r>
+              <a:rPr lang="en-US" sz="2400" dirty="0" err="1"/>
+              <a:t>Mapbox</a:t>
+            </a:r>
+            <a:r>
+              <a:rPr lang="en-US" sz="2400" dirty="0"/>
+              <a:t> so it had to be reset. </a:t>
+            </a:r>
+          </a:p>
+          <a:p>
+            <a:r>
+              <a:rPr lang="en-US" sz="2400" dirty="0"/>
+              <a:t>Other challenges included not being able to render a map on the page due to CSS style issues. Had to hard code CSS into the webpage html so that the map would show up, and even when it did there were borders on the tiles. So, it’s not the </a:t>
+            </a:r>
+            <a:r>
+              <a:rPr lang="en-US" sz="2400"/>
+              <a:t>best-looking map.</a:t>
+            </a:r>
+            <a:endParaRPr lang="en-US" sz="2400" dirty="0"/>
+          </a:p>
+          <a:p>
+            <a:endParaRPr lang="en-US" sz="2400" dirty="0"/>
           </a:p>
         </p:txBody>
       </p:sp>
     </p:spTree>
     <p:extLst>
       <p:ext uri="{BB962C8B-B14F-4D97-AF65-F5344CB8AC3E}">
-        <p14:creationId xmlns:p14="http://schemas.microsoft.com/office/powerpoint/2010/main" val="1350475094"/>
+        <p14:creationId xmlns:p14="http://schemas.microsoft.com/office/powerpoint/2010/main" val="3480467992"/>
       </p:ext>
     </p:extLst>
   </p:cSld>
@@ -6953,7 +6996,7 @@
           <a:p>
             <a:r>
               <a:rPr lang="en-US" dirty="0"/>
-              <a:t>Movie Map</a:t>
+              <a:t>Word Cloud</a:t>
             </a:r>
           </a:p>
         </p:txBody>
@@ -7452,7 +7495,7 @@
         </p:spPr>
         <p:txBody>
           <a:bodyPr anchor="t">
-            <a:normAutofit fontScale="85000" lnSpcReduction="10000"/>
+            <a:normAutofit/>
           </a:bodyPr>
           <a:lstStyle/>
           <a:p>
@@ -7461,63 +7504,27 @@
             </a:pPr>
             <a:r>
               <a:rPr lang="en-US" sz="2400" dirty="0"/>
-              <a:t>The idea was to use what we learned about leaflet and </a:t>
-            </a:r>
-            <a:r>
-              <a:rPr lang="en-US" sz="2400" dirty="0" err="1"/>
-              <a:t>Mapbox</a:t>
-            </a:r>
+              <a:t>The idea was that it would be interesting to see the word cloud generated from the keywords associated with each movie when filtering for the movie genre. </a:t>
+            </a:r>
+          </a:p>
+          <a:p>
             <a:r>
               <a:rPr lang="en-US" sz="2400" dirty="0"/>
-              <a:t> to generate a map with movie data. We thought it would be interesting to see the highest revenue movies for each production country. </a:t>
+              <a:t>Note: some movies are associated with more than one genre. </a:t>
             </a:r>
           </a:p>
           <a:p>
             <a:r>
               <a:rPr lang="en-US" sz="2400" dirty="0"/>
-              <a:t>Found the for each loop to be the best tool for extracting this data from the json object. </a:t>
-            </a:r>
-          </a:p>
-          <a:p>
-            <a:r>
-              <a:rPr lang="en-US" sz="2400" dirty="0"/>
-              <a:t>Note: many movies in the dataset had no production country so they had to be excluded.</a:t>
-            </a:r>
-          </a:p>
-          <a:p>
-            <a:r>
-              <a:rPr lang="en-US" sz="2400" dirty="0"/>
-              <a:t>Discovered that even so-called free sources of online data have limits. For example, had quota limits on looking up latitude and longitude for the production countries, and the API key did not always work on </a:t>
-            </a:r>
-            <a:r>
-              <a:rPr lang="en-US" sz="2400" dirty="0" err="1"/>
-              <a:t>Mapbox</a:t>
-            </a:r>
-            <a:r>
-              <a:rPr lang="en-US" sz="2400" dirty="0"/>
-              <a:t> so it had to be reset. </a:t>
-            </a:r>
-          </a:p>
-          <a:p>
-            <a:r>
-              <a:rPr lang="en-US" sz="2400" dirty="0"/>
-              <a:t>Other challenges included not being able to render a map on the page due to CSS style issues. Had to hard code CSS into the webpage html so that the map would show up, and even when it did there were borders on the tiles. So, it’s not the </a:t>
-            </a:r>
-            <a:r>
-              <a:rPr lang="en-US" sz="2400"/>
-              <a:t>best-looking map.</a:t>
-            </a:r>
-            <a:endParaRPr lang="en-US" sz="2400" dirty="0"/>
-          </a:p>
-          <a:p>
-            <a:endParaRPr lang="en-US" sz="2400" dirty="0"/>
+              <a:t>The cloud.js library is an open source word cloud generation library that we got from bl.ocks.org. This library used an older version of D3 so we enabled each visualization to be able to uniquely select the D3 version since other visualizations needed the latest version.</a:t>
+            </a:r>
           </a:p>
         </p:txBody>
       </p:sp>
     </p:spTree>
     <p:extLst>
       <p:ext uri="{BB962C8B-B14F-4D97-AF65-F5344CB8AC3E}">
-        <p14:creationId xmlns:p14="http://schemas.microsoft.com/office/powerpoint/2010/main" val="3480467992"/>
+        <p14:creationId xmlns:p14="http://schemas.microsoft.com/office/powerpoint/2010/main" val="1350475094"/>
       </p:ext>
     </p:extLst>
   </p:cSld>

</xml_diff>

<commit_message>
add edits to powerpoint
</commit_message>
<xml_diff>
--- a/Project_2_Presentation.pptx
+++ b/Project_2_Presentation.pptx
@@ -508,7 +508,7 @@
           <a:p>
             <a:fld id="{FE2819C9-2263-1A43-8F74-E42C80460847}" type="datetimeFigureOut">
               <a:rPr lang="en-US" smtClean="0"/>
-              <a:t>2/23/2021</a:t>
+              <a:t>2/23/21</a:t>
             </a:fld>
             <a:endParaRPr lang="en-US"/>
           </a:p>
@@ -706,7 +706,7 @@
           <a:p>
             <a:fld id="{FE2819C9-2263-1A43-8F74-E42C80460847}" type="datetimeFigureOut">
               <a:rPr lang="en-US" smtClean="0"/>
-              <a:t>2/23/2021</a:t>
+              <a:t>2/23/21</a:t>
             </a:fld>
             <a:endParaRPr lang="en-US"/>
           </a:p>
@@ -914,7 +914,7 @@
           <a:p>
             <a:fld id="{FE2819C9-2263-1A43-8F74-E42C80460847}" type="datetimeFigureOut">
               <a:rPr lang="en-US" smtClean="0"/>
-              <a:t>2/23/2021</a:t>
+              <a:t>2/23/21</a:t>
             </a:fld>
             <a:endParaRPr lang="en-US"/>
           </a:p>
@@ -1112,7 +1112,7 @@
           <a:p>
             <a:fld id="{FE2819C9-2263-1A43-8F74-E42C80460847}" type="datetimeFigureOut">
               <a:rPr lang="en-US" smtClean="0"/>
-              <a:t>2/23/2021</a:t>
+              <a:t>2/23/21</a:t>
             </a:fld>
             <a:endParaRPr lang="en-US"/>
           </a:p>
@@ -1387,7 +1387,7 @@
           <a:p>
             <a:fld id="{FE2819C9-2263-1A43-8F74-E42C80460847}" type="datetimeFigureOut">
               <a:rPr lang="en-US" smtClean="0"/>
-              <a:t>2/23/2021</a:t>
+              <a:t>2/23/21</a:t>
             </a:fld>
             <a:endParaRPr lang="en-US"/>
           </a:p>
@@ -1652,7 +1652,7 @@
           <a:p>
             <a:fld id="{FE2819C9-2263-1A43-8F74-E42C80460847}" type="datetimeFigureOut">
               <a:rPr lang="en-US" smtClean="0"/>
-              <a:t>2/23/2021</a:t>
+              <a:t>2/23/21</a:t>
             </a:fld>
             <a:endParaRPr lang="en-US"/>
           </a:p>
@@ -2064,7 +2064,7 @@
           <a:p>
             <a:fld id="{FE2819C9-2263-1A43-8F74-E42C80460847}" type="datetimeFigureOut">
               <a:rPr lang="en-US" smtClean="0"/>
-              <a:t>2/23/2021</a:t>
+              <a:t>2/23/21</a:t>
             </a:fld>
             <a:endParaRPr lang="en-US"/>
           </a:p>
@@ -2205,7 +2205,7 @@
           <a:p>
             <a:fld id="{FE2819C9-2263-1A43-8F74-E42C80460847}" type="datetimeFigureOut">
               <a:rPr lang="en-US" smtClean="0"/>
-              <a:t>2/23/2021</a:t>
+              <a:t>2/23/21</a:t>
             </a:fld>
             <a:endParaRPr lang="en-US"/>
           </a:p>
@@ -2318,7 +2318,7 @@
           <a:p>
             <a:fld id="{FE2819C9-2263-1A43-8F74-E42C80460847}" type="datetimeFigureOut">
               <a:rPr lang="en-US" smtClean="0"/>
-              <a:t>2/23/2021</a:t>
+              <a:t>2/23/21</a:t>
             </a:fld>
             <a:endParaRPr lang="en-US"/>
           </a:p>
@@ -2629,7 +2629,7 @@
           <a:p>
             <a:fld id="{FE2819C9-2263-1A43-8F74-E42C80460847}" type="datetimeFigureOut">
               <a:rPr lang="en-US" smtClean="0"/>
-              <a:t>2/23/2021</a:t>
+              <a:t>2/23/21</a:t>
             </a:fld>
             <a:endParaRPr lang="en-US"/>
           </a:p>
@@ -2917,7 +2917,7 @@
           <a:p>
             <a:fld id="{FE2819C9-2263-1A43-8F74-E42C80460847}" type="datetimeFigureOut">
               <a:rPr lang="en-US" smtClean="0"/>
-              <a:t>2/23/2021</a:t>
+              <a:t>2/23/21</a:t>
             </a:fld>
             <a:endParaRPr lang="en-US"/>
           </a:p>
@@ -3158,7 +3158,7 @@
           <a:p>
             <a:fld id="{FE2819C9-2263-1A43-8F74-E42C80460847}" type="datetimeFigureOut">
               <a:rPr lang="en-US" smtClean="0"/>
-              <a:t>2/23/2021</a:t>
+              <a:t>2/23/21</a:t>
             </a:fld>
             <a:endParaRPr lang="en-US"/>
           </a:p>
@@ -5632,21 +5632,8 @@
           <a:p>
             <a:r>
               <a:rPr lang="en-US" sz="1600" dirty="0"/>
-              <a:t>ETL Phase- we had a single ETL file where we shared ownership. This file performed all of the cleaning and loaded the MongoDB with the final data. Note: we had a “drop table” phase built in so that we could run this multiple times without having data duplicated in the MongoDB. Note: we had to be careful to ensure only one of us was working on the ETL file at a time since it was an </a:t>
-            </a:r>
-            <a:r>
-              <a:rPr lang="en-US" sz="1600" dirty="0" err="1"/>
-              <a:t>ipynb</a:t>
-            </a:r>
-            <a:r>
-              <a:rPr lang="en-US" sz="1600" dirty="0"/>
-              <a:t> file and these tend to have </a:t>
-            </a:r>
-            <a:r>
-              <a:rPr lang="en-US" sz="1600"/>
-              <a:t>git conflicts.</a:t>
-            </a:r>
-            <a:endParaRPr lang="en-US" sz="1600" dirty="0"/>
+              <a:t>ETL Phase- we had a single ETL file where we shared ownership. This file performed all the cleaning and loaded the MongoDB with the final data. Note: we had a “drop table” phase built in so that we could run this multiple times without having data duplicated in the MongoDB. Note: we had to be careful to ensure only one of us was working on the ETL file at a time since it was an ipynb file and these tend to have git conflicts.</a:t>
+            </a:r>
           </a:p>
           <a:p>
             <a:r>
@@ -5657,15 +5644,7 @@
           <a:p>
             <a:r>
               <a:rPr lang="en-US" sz="1600" dirty="0"/>
-              <a:t>Final coding of the app.py and *.</a:t>
-            </a:r>
-            <a:r>
-              <a:rPr lang="en-US" sz="1600" dirty="0" err="1"/>
-              <a:t>js</a:t>
-            </a:r>
-            <a:r>
-              <a:rPr lang="en-US" sz="1600" dirty="0"/>
-              <a:t> files. We were able to work on app.py at the same time since it is a simple text file and git works well with these. The rest of the files were unique to each visualization so there was not any overlap.</a:t>
+              <a:t>Final coding of the app.py and *.js files. We were able to work on app.py at the same time since it is a simple text file and git works well with these. The rest of the files were unique to each visualization so there was not any overlap.</a:t>
             </a:r>
           </a:p>
         </p:txBody>
@@ -6250,15 +6229,7 @@
             <a:pPr lvl="1"/>
             <a:r>
               <a:rPr lang="en-US" sz="1600" dirty="0"/>
-              <a:t>Many of the cells embedded in the csv file were chunks of JSON. We needed to use </a:t>
-            </a:r>
-            <a:r>
-              <a:rPr lang="en-US" sz="1600" dirty="0" err="1"/>
-              <a:t>ast.literal_eval</a:t>
-            </a:r>
-            <a:r>
-              <a:rPr lang="en-US" sz="1600" dirty="0"/>
-              <a:t> and custom functions to pull the actual data out of these.</a:t>
+              <a:t>Many of the cells embedded in the csv file were chunks of JSON. We needed to use ast.literal_eval and custom functions to pull the actual data out of these.</a:t>
             </a:r>
           </a:p>
           <a:p>
@@ -6272,30 +6243,14 @@
             <a:pPr lvl="1"/>
             <a:r>
               <a:rPr lang="en-US" sz="1600" dirty="0"/>
-              <a:t>Many cells were NA so, running </a:t>
-            </a:r>
-            <a:r>
-              <a:rPr lang="en-US" sz="1600" dirty="0" err="1"/>
-              <a:t>dropna</a:t>
-            </a:r>
+              <a:t>Many cells were NA so, running dropna too early in the cleaning flow took our dataset from 45000 entries down to 600.</a:t>
+            </a:r>
+          </a:p>
+          <a:p>
+            <a:pPr lvl="1"/>
             <a:r>
               <a:rPr lang="en-US" sz="1600" dirty="0"/>
-              <a:t> too early in the cleaning flow took our dataset from 45000 entries down to 600.</a:t>
-            </a:r>
-          </a:p>
-          <a:p>
-            <a:pPr lvl="1"/>
-            <a:r>
-              <a:rPr lang="en-US" sz="1600" dirty="0"/>
-              <a:t>The ID fields in one csv were strings while they were integers in another. We had to do conversion to get them both to integers before attempting the join on the tables. This was further complicated by some of the ID’s being NA so a simple </a:t>
-            </a:r>
-            <a:r>
-              <a:rPr lang="en-US" sz="1600" dirty="0" err="1"/>
-              <a:t>astype</a:t>
-            </a:r>
-            <a:r>
-              <a:rPr lang="en-US" sz="1600" dirty="0"/>
-              <a:t> command would not work.</a:t>
+              <a:t>The ID fields in one csv were strings while they were integers in another. We had to do conversion to get them both to integers before attempting the join on the tables. This was further complicated by some of the ID’s being NA so a simple astype command would not work.</a:t>
             </a:r>
           </a:p>
         </p:txBody>
@@ -6876,15 +6831,7 @@
             </a:pPr>
             <a:r>
               <a:rPr lang="en-US" sz="2400" dirty="0"/>
-              <a:t>The idea was to use what we learned about leaflet and </a:t>
-            </a:r>
-            <a:r>
-              <a:rPr lang="en-US" sz="2400" dirty="0" err="1"/>
-              <a:t>Mapbox</a:t>
-            </a:r>
-            <a:r>
-              <a:rPr lang="en-US" sz="2400" dirty="0"/>
-              <a:t> to generate a map with movie data. We thought it would be interesting to see the highest revenue movies for each production country. </a:t>
+              <a:t>The idea was to use what we learned about leaflet and Mapbox to generate a map with movie data. We thought it would be interesting to see the highest revenue movies for each production country. </a:t>
             </a:r>
           </a:p>
           <a:p>
@@ -6902,15 +6849,7 @@
           <a:p>
             <a:r>
               <a:rPr lang="en-US" sz="2400" dirty="0"/>
-              <a:t>Discovered that even so-called free sources of online data have limits. For example, had quota limits on looking up latitude and longitude for the production countries, and the API key did not always work on </a:t>
-            </a:r>
-            <a:r>
-              <a:rPr lang="en-US" sz="2400" dirty="0" err="1"/>
-              <a:t>Mapbox</a:t>
-            </a:r>
-            <a:r>
-              <a:rPr lang="en-US" sz="2400" dirty="0"/>
-              <a:t> so it had to be reset. </a:t>
+              <a:t>Discovered that even so-called free sources of online data have limits. For example, had quota limits on looking up latitude and longitude for the production countries, and the API key did not always work on Mapbox so it had to be reset. </a:t>
             </a:r>
           </a:p>
           <a:p>
@@ -8192,7 +8131,15 @@
           <a:p>
             <a:r>
               <a:rPr lang="en-US" sz="2400" dirty="0"/>
-              <a:t>The cloud.js library is an open source word cloud generation library that we got from bl.ocks.org. This library used an older version of D3 so we enabled each visualization to be able to uniquely select the D3 version since other visualizations needed the latest version.</a:t>
+              <a:t>The </a:t>
+            </a:r>
+            <a:r>
+              <a:rPr lang="en-US" sz="2400" dirty="0" err="1"/>
+              <a:t>cloud.js</a:t>
+            </a:r>
+            <a:r>
+              <a:rPr lang="en-US" sz="2400" dirty="0"/>
+              <a:t> library is an open-source word cloud generation library that we got from bl.ocks.org. This library used an older version of D3 so we enabled each visualization to be able to uniquely select the D3 version since other visualizations needed the latest version.</a:t>
             </a:r>
           </a:p>
         </p:txBody>

</xml_diff>